<commit_message>
readme and pptx update
</commit_message>
<xml_diff>
--- a/presentation/Multiple Sclerosis Disease ​ Prediction model.pptx
+++ b/presentation/Multiple Sclerosis Disease ​ Prediction model.pptx
@@ -128,39 +128,11 @@
   <p1510:revLst>
     <p1510:client id="{31C60D38-40A4-41B4-AA31-E14862686321}" v="420" dt="2024-06-03T13:29:45.086"/>
     <p1510:client id="{83821311-94DD-42F5-BEEF-554486C29B99}" v="149" dt="2024-06-03T13:55:50.700"/>
+    <p1510:client id="{9026C952-E83F-4590-9207-25417F3DF6FB}" v="2" dt="2024-06-03T14:42:13.267"/>
     <p1510:client id="{C61186FD-19F1-4664-A5DC-AEE335AF117E}" v="784" dt="2024-06-03T12:42:09.216"/>
     <p1510:client id="{F558B3BB-F80F-4672-822E-BDBB9B8FF7B6}" v="160" dt="2024-06-03T13:47:23.170"/>
   </p1510:revLst>
 </p1510:revInfo>
-</file>
-
-<file path=ppt/changesInfos/changesInfo1.xml><?xml version="1.0" encoding="utf-8"?>
-<pc:chgInfo xmlns:a="http://schemas.openxmlformats.org/drawingml/2006/main" xmlns:r="http://schemas.openxmlformats.org/officeDocument/2006/relationships" xmlns:ac="http://schemas.microsoft.com/office/drawing/2013/main/command" xmlns:pc="http://schemas.microsoft.com/office/powerpoint/2013/main/command">
-  <pc:docChgLst>
-    <pc:chgData name="Panagiotis Apostolou" userId="0184405c1bc6acf7" providerId="Windows Live" clId="Web-{83821311-94DD-42F5-BEEF-554486C29B99}"/>
-    <pc:docChg chg="modSld">
-      <pc:chgData name="Panagiotis Apostolou" userId="0184405c1bc6acf7" providerId="Windows Live" clId="Web-{83821311-94DD-42F5-BEEF-554486C29B99}" dt="2024-06-03T13:55:50.700" v="145" actId="14100"/>
-      <pc:docMkLst>
-        <pc:docMk/>
-      </pc:docMkLst>
-      <pc:sldChg chg="modSp">
-        <pc:chgData name="Panagiotis Apostolou" userId="0184405c1bc6acf7" providerId="Windows Live" clId="Web-{83821311-94DD-42F5-BEEF-554486C29B99}" dt="2024-06-03T13:55:50.700" v="145" actId="14100"/>
-        <pc:sldMkLst>
-          <pc:docMk/>
-          <pc:sldMk cId="302069119" sldId="261"/>
-        </pc:sldMkLst>
-        <pc:spChg chg="mod">
-          <ac:chgData name="Panagiotis Apostolou" userId="0184405c1bc6acf7" providerId="Windows Live" clId="Web-{83821311-94DD-42F5-BEEF-554486C29B99}" dt="2024-06-03T13:55:50.700" v="145" actId="14100"/>
-          <ac:spMkLst>
-            <pc:docMk/>
-            <pc:sldMk cId="302069119" sldId="261"/>
-            <ac:spMk id="3" creationId="{51631693-A200-7176-252E-6FBF8D0BD5CB}"/>
-          </ac:spMkLst>
-        </pc:spChg>
-      </pc:sldChg>
-    </pc:docChg>
-  </pc:docChgLst>
-</pc:chgInfo>
 </file>
 
 <file path=ppt/slideLayouts/slideLayout1.xml><?xml version="1.0" encoding="utf-8"?>
@@ -12014,21 +11986,7 @@
                 <a:ea typeface="+mn-lt"/>
                 <a:cs typeface="+mn-lt"/>
               </a:rPr>
-              <a:t>The sample size was 273 patients of whom 125 were </a:t>
-            </a:r>
-            <a:r>
-              <a:rPr lang="en-US" dirty="0" err="1">
-                <a:ea typeface="+mn-lt"/>
-                <a:cs typeface="+mn-lt"/>
-              </a:rPr>
-              <a:t>giagnosed</a:t>
-            </a:r>
-            <a:r>
-              <a:rPr lang="en-US" dirty="0">
-                <a:ea typeface="+mn-lt"/>
-                <a:cs typeface="+mn-lt"/>
-              </a:rPr>
-              <a:t> with the disease.</a:t>
+              <a:t>The sample size was 273 patients of whom 125 were diagnosed with the disease.</a:t>
             </a:r>
           </a:p>
           <a:p>

</xml_diff>